<commit_message>
Drafting slides about bootstrap cards
</commit_message>
<xml_diff>
--- a/bootstrap/slides/02 Bootstrap Grid System.pptx
+++ b/bootstrap/slides/02 Bootstrap Grid System.pptx
@@ -13,6 +13,7 @@
     <p:sldId id="274" r:id="rId10"/>
     <p:sldId id="275" r:id="rId11"/>
     <p:sldId id="262" r:id="rId12"/>
+    <p:sldId id="276" r:id="rId13"/>
   </p:sldIdLst>
   <p:sldSz cx="12192000" cy="6858000"/>
   <p:notesSz cx="6858000" cy="9144000"/>
@@ -4187,7 +4188,22 @@
                   <a:schemeClr val="tx1"/>
                 </a:solidFill>
               </a:rPr>
-              <a:t>Bootstrap Grid System</a:t>
+              <a:t>Bootstrap </a:t>
+            </a:r>
+            <a:br>
+              <a:rPr lang="en-US" sz="4400">
+                <a:solidFill>
+                  <a:schemeClr val="tx1"/>
+                </a:solidFill>
+              </a:rPr>
+            </a:br>
+            <a:r>
+              <a:rPr lang="en-US" sz="4400">
+                <a:solidFill>
+                  <a:schemeClr val="tx1"/>
+                </a:solidFill>
+              </a:rPr>
+              <a:t>Grid System</a:t>
             </a:r>
             <a:endParaRPr lang="en-US" sz="4400" dirty="0">
               <a:solidFill>
@@ -4403,7 +4419,16 @@
           <a:p>
             <a:r>
               <a:rPr lang="en-US" sz="1400">
-                <a:hlinkClick r:id="rId2"/>
+                <a:solidFill>
+                  <a:srgbClr val="00B0F0"/>
+                </a:solidFill>
+                <a:hlinkClick r:id="rId2">
+                  <a:extLst>
+                    <a:ext uri="{A12FA001-AC4F-418D-AE19-62706E023703}">
+                      <ahyp:hlinkClr xmlns:ahyp="http://schemas.microsoft.com/office/drawing/2018/hyperlinkcolor" val="tx"/>
+                    </a:ext>
+                  </a:extLst>
+                </a:hlinkClick>
               </a:rPr>
               <a:t>https://getbootstrap.com/docs/4.5/layout/overview/</a:t>
             </a:r>
@@ -4673,7 +4698,16 @@
           <a:p>
             <a:r>
               <a:rPr lang="en-US" sz="1400">
-                <a:hlinkClick r:id="rId2"/>
+                <a:solidFill>
+                  <a:srgbClr val="00B0F0"/>
+                </a:solidFill>
+                <a:hlinkClick r:id="rId2">
+                  <a:extLst>
+                    <a:ext uri="{A12FA001-AC4F-418D-AE19-62706E023703}">
+                      <ahyp:hlinkClr xmlns:ahyp="http://schemas.microsoft.com/office/drawing/2018/hyperlinkcolor" val="tx"/>
+                    </a:ext>
+                  </a:extLst>
+                </a:hlinkClick>
               </a:rPr>
               <a:t>https://getbootstrap.com/docs/4.5/layout/overview/</a:t>
             </a:r>
@@ -5864,52 +5898,7 @@
                   </a:extLst>
                 </a:hlinkClick>
               </a:rPr>
-              <a:t>f</a:t>
-            </a:r>
-            <a:r>
-              <a:rPr lang="en-US" sz="1800">
-                <a:solidFill>
-                  <a:srgbClr val="00B0F0"/>
-                </a:solidFill>
-                <a:hlinkClick r:id="rId2">
-                  <a:extLst>
-                    <a:ext uri="{A12FA001-AC4F-418D-AE19-62706E023703}">
-                      <ahyp:hlinkClr xmlns:ahyp="http://schemas.microsoft.com/office/drawing/2018/hyperlinkcolor" val="tx"/>
-                    </a:ext>
-                  </a:extLst>
-                </a:hlinkClick>
-              </a:rPr>
-              <a:t>lex</a:t>
-            </a:r>
-            <a:r>
-              <a:rPr lang="en-US" sz="1800">
-                <a:solidFill>
-                  <a:srgbClr val="00B0F0"/>
-                </a:solidFill>
-                <a:hlinkClick r:id="rId2">
-                  <a:extLst>
-                    <a:ext uri="{A12FA001-AC4F-418D-AE19-62706E023703}">
-                      <ahyp:hlinkClr xmlns:ahyp="http://schemas.microsoft.com/office/drawing/2018/hyperlinkcolor" val="tx"/>
-                    </a:ext>
-                  </a:extLst>
-                </a:hlinkClick>
-              </a:rPr>
-              <a:t>b</a:t>
-            </a:r>
-            <a:r>
-              <a:rPr lang="en-US" sz="1800">
-                <a:solidFill>
-                  <a:srgbClr val="00B0F0"/>
-                </a:solidFill>
-                <a:hlinkClick r:id="rId2">
-                  <a:extLst>
-                    <a:ext uri="{A12FA001-AC4F-418D-AE19-62706E023703}">
-                      <ahyp:hlinkClr xmlns:ahyp="http://schemas.microsoft.com/office/drawing/2018/hyperlinkcolor" val="tx"/>
-                    </a:ext>
-                  </a:extLst>
-                </a:hlinkClick>
-              </a:rPr>
-              <a:t>ox</a:t>
+              <a:t>flexbox</a:t>
             </a:r>
             <a:r>
               <a:rPr lang="en-US" sz="1800"/>
@@ -9788,6 +9777,113 @@
     <p:extLst>
       <p:ext uri="{BB962C8B-B14F-4D97-AF65-F5344CB8AC3E}">
         <p14:creationId xmlns:p14="http://schemas.microsoft.com/office/powerpoint/2010/main" val="1697607841"/>
+      </p:ext>
+    </p:extLst>
+  </p:cSld>
+  <p:clrMapOvr>
+    <a:masterClrMapping/>
+  </p:clrMapOvr>
+</p:sld>
+</file>
+
+<file path=ppt/slides/slide9.xml><?xml version="1.0" encoding="utf-8"?>
+<p:sld xmlns:a="http://schemas.openxmlformats.org/drawingml/2006/main" xmlns:r="http://schemas.openxmlformats.org/officeDocument/2006/relationships" xmlns:p="http://schemas.openxmlformats.org/presentationml/2006/main">
+  <p:cSld>
+    <p:spTree>
+      <p:nvGrpSpPr>
+        <p:cNvPr id="1" name=""/>
+        <p:cNvGrpSpPr/>
+        <p:nvPr/>
+      </p:nvGrpSpPr>
+      <p:grpSpPr>
+        <a:xfrm>
+          <a:off x="0" y="0"/>
+          <a:ext cx="0" cy="0"/>
+          <a:chOff x="0" y="0"/>
+          <a:chExt cx="0" cy="0"/>
+        </a:xfrm>
+      </p:grpSpPr>
+      <p:sp>
+        <p:nvSpPr>
+          <p:cNvPr id="2" name="Title 1">
+            <a:extLst>
+              <a:ext uri="{FF2B5EF4-FFF2-40B4-BE49-F238E27FC236}">
+                <a16:creationId xmlns:a16="http://schemas.microsoft.com/office/drawing/2014/main" id="{8991F276-0EEF-406B-9F03-F72F9CFC6B94}"/>
+              </a:ext>
+            </a:extLst>
+          </p:cNvPr>
+          <p:cNvSpPr>
+            <a:spLocks noGrp="1"/>
+          </p:cNvSpPr>
+          <p:nvPr>
+            <p:ph type="title"/>
+          </p:nvPr>
+        </p:nvSpPr>
+        <p:spPr/>
+        <p:txBody>
+          <a:bodyPr/>
+          <a:lstStyle/>
+          <a:p>
+            <a:r>
+              <a:rPr lang="en-US"/>
+              <a:t>More Examples</a:t>
+            </a:r>
+          </a:p>
+        </p:txBody>
+      </p:sp>
+      <p:sp>
+        <p:nvSpPr>
+          <p:cNvPr id="3" name="Content Placeholder 2">
+            <a:extLst>
+              <a:ext uri="{FF2B5EF4-FFF2-40B4-BE49-F238E27FC236}">
+                <a16:creationId xmlns:a16="http://schemas.microsoft.com/office/drawing/2014/main" id="{D0AEC26E-461C-4A91-9C4D-40FA6B91872C}"/>
+              </a:ext>
+            </a:extLst>
+          </p:cNvPr>
+          <p:cNvSpPr>
+            <a:spLocks noGrp="1"/>
+          </p:cNvSpPr>
+          <p:nvPr>
+            <p:ph idx="1"/>
+          </p:nvPr>
+        </p:nvSpPr>
+        <p:spPr/>
+        <p:txBody>
+          <a:bodyPr anchor="ctr">
+            <a:normAutofit/>
+          </a:bodyPr>
+          <a:lstStyle/>
+          <a:p>
+            <a:pPr marL="0" indent="0">
+              <a:buNone/>
+            </a:pPr>
+            <a:r>
+              <a:rPr lang="en-US" sz="3200">
+                <a:solidFill>
+                  <a:srgbClr val="00B0F0"/>
+                </a:solidFill>
+                <a:hlinkClick r:id="rId2">
+                  <a:extLst>
+                    <a:ext uri="{A12FA001-AC4F-418D-AE19-62706E023703}">
+                      <ahyp:hlinkClr xmlns:ahyp="http://schemas.microsoft.com/office/drawing/2018/hyperlinkcolor" val="tx"/>
+                    </a:ext>
+                  </a:extLst>
+                </a:hlinkClick>
+              </a:rPr>
+              <a:t>https://getbootstrap.com/docs/4.5/layout/grid/</a:t>
+            </a:r>
+            <a:endParaRPr lang="en-US" sz="3200">
+              <a:solidFill>
+                <a:srgbClr val="00B0F0"/>
+              </a:solidFill>
+            </a:endParaRPr>
+          </a:p>
+        </p:txBody>
+      </p:sp>
+    </p:spTree>
+    <p:extLst>
+      <p:ext uri="{BB962C8B-B14F-4D97-AF65-F5344CB8AC3E}">
+        <p14:creationId xmlns:p14="http://schemas.microsoft.com/office/powerpoint/2010/main" val="832672444"/>
       </p:ext>
     </p:extLst>
   </p:cSld>
@@ -10074,12 +10170,12 @@
 </file>
 
 <file path=customXml/item1.xml><?xml version="1.0" encoding="utf-8"?>
-<?mso-contentType ?>
-<FormTemplates xmlns="http://schemas.microsoft.com/sharepoint/v3/contenttype/forms">
-  <Display>DocumentLibraryForm</Display>
-  <Edit>DocumentLibraryForm</Edit>
-  <New>DocumentLibraryForm</New>
-</FormTemplates>
+<p:properties xmlns:p="http://schemas.microsoft.com/office/2006/metadata/properties" xmlns:xsi="http://www.w3.org/2001/XMLSchema-instance" xmlns:pc="http://schemas.microsoft.com/office/infopath/2007/PartnerControls">
+  <documentManagement>
+    <Status xmlns="71af3243-3dd4-4a8d-8c0d-dd76da1f02a5">Not started</Status>
+    <MediaServiceKeyPoints xmlns="71af3243-3dd4-4a8d-8c0d-dd76da1f02a5" xsi:nil="true"/>
+  </documentManagement>
+</p:properties>
 </file>
 
 <file path=customXml/item2.xml><?xml version="1.0" encoding="utf-8"?>
@@ -10304,18 +10400,20 @@
 </file>
 
 <file path=customXml/item3.xml><?xml version="1.0" encoding="utf-8"?>
-<p:properties xmlns:p="http://schemas.microsoft.com/office/2006/metadata/properties" xmlns:xsi="http://www.w3.org/2001/XMLSchema-instance" xmlns:pc="http://schemas.microsoft.com/office/infopath/2007/PartnerControls">
-  <documentManagement>
-    <Status xmlns="71af3243-3dd4-4a8d-8c0d-dd76da1f02a5">Not started</Status>
-    <MediaServiceKeyPoints xmlns="71af3243-3dd4-4a8d-8c0d-dd76da1f02a5" xsi:nil="true"/>
-  </documentManagement>
-</p:properties>
+<?mso-contentType ?>
+<FormTemplates xmlns="http://schemas.microsoft.com/sharepoint/v3/contenttype/forms">
+  <Display>DocumentLibraryForm</Display>
+  <Edit>DocumentLibraryForm</Edit>
+  <New>DocumentLibraryForm</New>
+</FormTemplates>
 </file>
 
 <file path=customXml/itemProps1.xml><?xml version="1.0" encoding="utf-8"?>
-<ds:datastoreItem xmlns:ds="http://schemas.openxmlformats.org/officeDocument/2006/customXml" ds:itemID="{CDB58277-F8DF-46FF-84EC-EF41B835E69F}">
+<ds:datastoreItem xmlns:ds="http://schemas.openxmlformats.org/officeDocument/2006/customXml" ds:itemID="{137651BA-F45C-4845-9AB3-E0A65B39F5E1}">
   <ds:schemaRefs>
-    <ds:schemaRef ds:uri="http://schemas.microsoft.com/sharepoint/v3/contenttype/forms"/>
+    <ds:schemaRef ds:uri="http://schemas.microsoft.com/office/2006/metadata/properties"/>
+    <ds:schemaRef ds:uri="http://schemas.microsoft.com/office/infopath/2007/PartnerControls"/>
+    <ds:schemaRef ds:uri="71af3243-3dd4-4a8d-8c0d-dd76da1f02a5"/>
   </ds:schemaRefs>
 </ds:datastoreItem>
 </file>
@@ -10340,11 +10438,9 @@
 </file>
 
 <file path=customXml/itemProps3.xml><?xml version="1.0" encoding="utf-8"?>
-<ds:datastoreItem xmlns:ds="http://schemas.openxmlformats.org/officeDocument/2006/customXml" ds:itemID="{137651BA-F45C-4845-9AB3-E0A65B39F5E1}">
+<ds:datastoreItem xmlns:ds="http://schemas.openxmlformats.org/officeDocument/2006/customXml" ds:itemID="{CDB58277-F8DF-46FF-84EC-EF41B835E69F}">
   <ds:schemaRefs>
-    <ds:schemaRef ds:uri="http://schemas.microsoft.com/office/2006/metadata/properties"/>
-    <ds:schemaRef ds:uri="http://schemas.microsoft.com/office/infopath/2007/PartnerControls"/>
-    <ds:schemaRef ds:uri="71af3243-3dd4-4a8d-8c0d-dd76da1f02a5"/>
+    <ds:schemaRef ds:uri="http://schemas.microsoft.com/sharepoint/v3/contenttype/forms"/>
   </ds:schemaRefs>
 </ds:datastoreItem>
 </file>
</xml_diff>

<commit_message>
Fixing indentation in example
</commit_message>
<xml_diff>
--- a/bootstrap/slides/02 Bootstrap Grid System.pptx
+++ b/bootstrap/slides/02 Bootstrap Grid System.pptx
@@ -589,7 +589,7 @@
           <a:p>
             <a:fld id="{EA0C0817-A112-4847-8014-A94B7D2A4EA3}" type="datetime1">
               <a:rPr lang="en-US" smtClean="0"/>
-              <a:t>6/23/2020</a:t>
+              <a:t>6/30/2020</a:t>
             </a:fld>
             <a:endParaRPr lang="en-US" dirty="0"/>
           </a:p>
@@ -791,7 +791,7 @@
           <a:p>
             <a:fld id="{7332B432-ACDA-4023-A761-2BAB76577B62}" type="datetime1">
               <a:rPr lang="en-US" smtClean="0"/>
-              <a:t>6/23/2020</a:t>
+              <a:t>6/30/2020</a:t>
             </a:fld>
             <a:endParaRPr lang="en-US" dirty="0"/>
           </a:p>
@@ -1390,7 +1390,7 @@
           <a:p>
             <a:fld id="{D9C646AA-F36E-4540-911D-FFFC0A0EF24A}" type="datetime1">
               <a:rPr lang="en-US" smtClean="0"/>
-              <a:t>6/23/2020</a:t>
+              <a:t>6/30/2020</a:t>
             </a:fld>
             <a:endParaRPr lang="en-US" dirty="0"/>
           </a:p>
@@ -1710,7 +1710,7 @@
           <a:p>
             <a:fld id="{69186D26-FA5F-4637-B602-B7C2DC34CFD4}" type="datetime1">
               <a:rPr lang="en-US" smtClean="0"/>
-              <a:t>6/23/2020</a:t>
+              <a:t>6/30/2020</a:t>
             </a:fld>
             <a:endParaRPr lang="en-US" dirty="0"/>
           </a:p>
@@ -2147,7 +2147,7 @@
           <a:p>
             <a:fld id="{8A7F15D8-96D1-4781-BC50-CA8A088B2FE4}" type="datetime1">
               <a:rPr lang="en-US" smtClean="0"/>
-              <a:t>6/23/2020</a:t>
+              <a:t>6/30/2020</a:t>
             </a:fld>
             <a:endParaRPr lang="en-US" dirty="0"/>
           </a:p>
@@ -2265,7 +2265,7 @@
           <a:p>
             <a:fld id="{F9A96C99-B8F8-4528-BD05-0E16E943DC09}" type="datetime1">
               <a:rPr lang="en-US" smtClean="0"/>
-              <a:t>6/23/2020</a:t>
+              <a:t>6/30/2020</a:t>
             </a:fld>
             <a:endParaRPr lang="en-US" dirty="0"/>
           </a:p>
@@ -2360,7 +2360,7 @@
           <a:p>
             <a:fld id="{03636942-C211-4B28-8DBD-C953E00AF71B}" type="datetime1">
               <a:rPr lang="en-US" smtClean="0"/>
-              <a:t>6/23/2020</a:t>
+              <a:t>6/30/2020</a:t>
             </a:fld>
             <a:endParaRPr lang="en-US" dirty="0"/>
           </a:p>
@@ -2777,7 +2777,7 @@
           <a:p>
             <a:fld id="{7E8D12A6-918A-48BD-8CB9-CA713993B0EA}" type="datetime1">
               <a:rPr lang="en-US" smtClean="0"/>
-              <a:t>6/23/2020</a:t>
+              <a:t>6/30/2020</a:t>
             </a:fld>
             <a:endParaRPr lang="en-US" dirty="0"/>
           </a:p>
@@ -3039,7 +3039,7 @@
             <a:fld id="{E778CE86-875F-4587-BCF6-FA054AFC0D53}" type="datetime1">
               <a:rPr lang="en-US" smtClean="0"/>
               <a:pPr/>
-              <a:t>6/23/2020</a:t>
+              <a:t>6/30/2020</a:t>
             </a:fld>
             <a:endParaRPr lang="en-US" dirty="0"/>
           </a:p>
@@ -3555,7 +3555,7 @@
           <a:p>
             <a:fld id="{F6FA2B21-3FCD-4721-B95C-427943F61125}" type="datetime1">
               <a:rPr lang="en-US" smtClean="0"/>
-              <a:t>6/23/2020</a:t>
+              <a:t>6/30/2020</a:t>
             </a:fld>
             <a:endParaRPr lang="en-US" dirty="0"/>
           </a:p>
@@ -7405,7 +7405,7 @@
               <a:rPr lang="en-US">
                 <a:latin typeface="Consolas" panose="020B0609020204030204" pitchFamily="49" charset="0"/>
               </a:rPr>
-              <a:t>&lt;/div&gt;</a:t>
+              <a:t>  &lt;/div&gt;</a:t>
             </a:r>
           </a:p>
           <a:p>
@@ -10170,12 +10170,12 @@
 </file>
 
 <file path=customXml/item1.xml><?xml version="1.0" encoding="utf-8"?>
-<p:properties xmlns:p="http://schemas.microsoft.com/office/2006/metadata/properties" xmlns:xsi="http://www.w3.org/2001/XMLSchema-instance" xmlns:pc="http://schemas.microsoft.com/office/infopath/2007/PartnerControls">
-  <documentManagement>
-    <Status xmlns="71af3243-3dd4-4a8d-8c0d-dd76da1f02a5">Not started</Status>
-    <MediaServiceKeyPoints xmlns="71af3243-3dd4-4a8d-8c0d-dd76da1f02a5" xsi:nil="true"/>
-  </documentManagement>
-</p:properties>
+<?mso-contentType ?>
+<FormTemplates xmlns="http://schemas.microsoft.com/sharepoint/v3/contenttype/forms">
+  <Display>DocumentLibraryForm</Display>
+  <Edit>DocumentLibraryForm</Edit>
+  <New>DocumentLibraryForm</New>
+</FormTemplates>
 </file>
 
 <file path=customXml/item2.xml><?xml version="1.0" encoding="utf-8"?>
@@ -10400,20 +10400,18 @@
 </file>
 
 <file path=customXml/item3.xml><?xml version="1.0" encoding="utf-8"?>
-<?mso-contentType ?>
-<FormTemplates xmlns="http://schemas.microsoft.com/sharepoint/v3/contenttype/forms">
-  <Display>DocumentLibraryForm</Display>
-  <Edit>DocumentLibraryForm</Edit>
-  <New>DocumentLibraryForm</New>
-</FormTemplates>
+<p:properties xmlns:p="http://schemas.microsoft.com/office/2006/metadata/properties" xmlns:xsi="http://www.w3.org/2001/XMLSchema-instance" xmlns:pc="http://schemas.microsoft.com/office/infopath/2007/PartnerControls">
+  <documentManagement>
+    <Status xmlns="71af3243-3dd4-4a8d-8c0d-dd76da1f02a5">Not started</Status>
+    <MediaServiceKeyPoints xmlns="71af3243-3dd4-4a8d-8c0d-dd76da1f02a5" xsi:nil="true"/>
+  </documentManagement>
+</p:properties>
 </file>
 
 <file path=customXml/itemProps1.xml><?xml version="1.0" encoding="utf-8"?>
-<ds:datastoreItem xmlns:ds="http://schemas.openxmlformats.org/officeDocument/2006/customXml" ds:itemID="{137651BA-F45C-4845-9AB3-E0A65B39F5E1}">
+<ds:datastoreItem xmlns:ds="http://schemas.openxmlformats.org/officeDocument/2006/customXml" ds:itemID="{CDB58277-F8DF-46FF-84EC-EF41B835E69F}">
   <ds:schemaRefs>
-    <ds:schemaRef ds:uri="http://schemas.microsoft.com/office/2006/metadata/properties"/>
-    <ds:schemaRef ds:uri="http://schemas.microsoft.com/office/infopath/2007/PartnerControls"/>
-    <ds:schemaRef ds:uri="71af3243-3dd4-4a8d-8c0d-dd76da1f02a5"/>
+    <ds:schemaRef ds:uri="http://schemas.microsoft.com/sharepoint/v3/contenttype/forms"/>
   </ds:schemaRefs>
 </ds:datastoreItem>
 </file>
@@ -10438,9 +10436,11 @@
 </file>
 
 <file path=customXml/itemProps3.xml><?xml version="1.0" encoding="utf-8"?>
-<ds:datastoreItem xmlns:ds="http://schemas.openxmlformats.org/officeDocument/2006/customXml" ds:itemID="{CDB58277-F8DF-46FF-84EC-EF41B835E69F}">
+<ds:datastoreItem xmlns:ds="http://schemas.openxmlformats.org/officeDocument/2006/customXml" ds:itemID="{137651BA-F45C-4845-9AB3-E0A65B39F5E1}">
   <ds:schemaRefs>
-    <ds:schemaRef ds:uri="http://schemas.microsoft.com/sharepoint/v3/contenttype/forms"/>
+    <ds:schemaRef ds:uri="http://schemas.microsoft.com/office/2006/metadata/properties"/>
+    <ds:schemaRef ds:uri="http://schemas.microsoft.com/office/infopath/2007/PartnerControls"/>
+    <ds:schemaRef ds:uri="71af3243-3dd4-4a8d-8c0d-dd76da1f02a5"/>
   </ds:schemaRefs>
 </ds:datastoreItem>
 </file>
</xml_diff>